<commit_message>
Stop codon was added to StrepC1 seq
</commit_message>
<xml_diff>
--- a/images/seqs_phiHau_StrepC.pptx
+++ b/images/seqs_phiHau_StrepC.pptx
@@ -208,7 +208,7 @@
           <a:p>
             <a:fld id="{C571D33F-B151-5442-9D79-DA0A881D815F}" type="datetimeFigureOut">
               <a:rPr lang="en-US" smtClean="0"/>
-              <a:t>3/10/22</a:t>
+              <a:t>8/1/22</a:t>
             </a:fld>
             <a:endParaRPr lang="en-US"/>
           </a:p>
@@ -743,7 +743,7 @@
           <a:p>
             <a:fld id="{01197F44-DB72-474A-9754-31703E05C006}" type="datetimeFigureOut">
               <a:rPr lang="en-US" smtClean="0"/>
-              <a:t>3/10/22</a:t>
+              <a:t>8/1/22</a:t>
             </a:fld>
             <a:endParaRPr lang="en-US"/>
           </a:p>
@@ -911,7 +911,7 @@
           <a:p>
             <a:fld id="{01197F44-DB72-474A-9754-31703E05C006}" type="datetimeFigureOut">
               <a:rPr lang="en-US" smtClean="0"/>
-              <a:t>3/10/22</a:t>
+              <a:t>8/1/22</a:t>
             </a:fld>
             <a:endParaRPr lang="en-US"/>
           </a:p>
@@ -1089,7 +1089,7 @@
           <a:p>
             <a:fld id="{01197F44-DB72-474A-9754-31703E05C006}" type="datetimeFigureOut">
               <a:rPr lang="en-US" smtClean="0"/>
-              <a:t>3/10/22</a:t>
+              <a:t>8/1/22</a:t>
             </a:fld>
             <a:endParaRPr lang="en-US"/>
           </a:p>
@@ -1257,7 +1257,7 @@
           <a:p>
             <a:fld id="{01197F44-DB72-474A-9754-31703E05C006}" type="datetimeFigureOut">
               <a:rPr lang="en-US" smtClean="0"/>
-              <a:t>3/10/22</a:t>
+              <a:t>8/1/22</a:t>
             </a:fld>
             <a:endParaRPr lang="en-US"/>
           </a:p>
@@ -1502,7 +1502,7 @@
           <a:p>
             <a:fld id="{01197F44-DB72-474A-9754-31703E05C006}" type="datetimeFigureOut">
               <a:rPr lang="en-US" smtClean="0"/>
-              <a:t>3/10/22</a:t>
+              <a:t>8/1/22</a:t>
             </a:fld>
             <a:endParaRPr lang="en-US"/>
           </a:p>
@@ -1787,7 +1787,7 @@
           <a:p>
             <a:fld id="{01197F44-DB72-474A-9754-31703E05C006}" type="datetimeFigureOut">
               <a:rPr lang="en-US" smtClean="0"/>
-              <a:t>3/10/22</a:t>
+              <a:t>8/1/22</a:t>
             </a:fld>
             <a:endParaRPr lang="en-US"/>
           </a:p>
@@ -2206,7 +2206,7 @@
           <a:p>
             <a:fld id="{01197F44-DB72-474A-9754-31703E05C006}" type="datetimeFigureOut">
               <a:rPr lang="en-US" smtClean="0"/>
-              <a:t>3/10/22</a:t>
+              <a:t>8/1/22</a:t>
             </a:fld>
             <a:endParaRPr lang="en-US"/>
           </a:p>
@@ -2323,7 +2323,7 @@
           <a:p>
             <a:fld id="{01197F44-DB72-474A-9754-31703E05C006}" type="datetimeFigureOut">
               <a:rPr lang="en-US" smtClean="0"/>
-              <a:t>3/10/22</a:t>
+              <a:t>8/1/22</a:t>
             </a:fld>
             <a:endParaRPr lang="en-US"/>
           </a:p>
@@ -2418,7 +2418,7 @@
           <a:p>
             <a:fld id="{01197F44-DB72-474A-9754-31703E05C006}" type="datetimeFigureOut">
               <a:rPr lang="en-US" smtClean="0"/>
-              <a:t>3/10/22</a:t>
+              <a:t>8/1/22</a:t>
             </a:fld>
             <a:endParaRPr lang="en-US"/>
           </a:p>
@@ -2693,7 +2693,7 @@
           <a:p>
             <a:fld id="{01197F44-DB72-474A-9754-31703E05C006}" type="datetimeFigureOut">
               <a:rPr lang="en-US" smtClean="0"/>
-              <a:t>3/10/22</a:t>
+              <a:t>8/1/22</a:t>
             </a:fld>
             <a:endParaRPr lang="en-US"/>
           </a:p>
@@ -2945,7 +2945,7 @@
           <a:p>
             <a:fld id="{01197F44-DB72-474A-9754-31703E05C006}" type="datetimeFigureOut">
               <a:rPr lang="en-US" smtClean="0"/>
-              <a:t>3/10/22</a:t>
+              <a:t>8/1/22</a:t>
             </a:fld>
             <a:endParaRPr lang="en-US"/>
           </a:p>
@@ -3156,7 +3156,7 @@
           <a:p>
             <a:fld id="{01197F44-DB72-474A-9754-31703E05C006}" type="datetimeFigureOut">
               <a:rPr lang="en-US" smtClean="0"/>
-              <a:t>3/10/22</a:t>
+              <a:t>8/1/22</a:t>
             </a:fld>
             <a:endParaRPr lang="en-US"/>
           </a:p>
@@ -3546,7 +3546,7 @@
           <p:nvPr>
             <p:extLst>
               <p:ext uri="{D42A27DB-BD31-4B8C-83A1-F6EECF244321}">
-                <p14:modId xmlns:p14="http://schemas.microsoft.com/office/powerpoint/2010/main" val="3978865947"/>
+                <p14:modId xmlns:p14="http://schemas.microsoft.com/office/powerpoint/2010/main" val="1948490757"/>
               </p:ext>
             </p:extLst>
           </p:nvPr>
@@ -5025,7 +5025,21 @@
                           <a:latin typeface="Courier New"/>
                           <a:cs typeface="Courier New"/>
                         </a:rPr>
-                        <a:t>&gt;ACEW01000274.1:c42728-41083 Streptomyces sp. C cont1.274</a:t>
+                        <a:t>&gt;ACEW01000274.1:c42728-4108</a:t>
+                      </a:r>
+                      <a:r>
+                        <a:rPr lang="ru-RU" sz="800" dirty="0">
+                          <a:latin typeface="Courier New"/>
+                          <a:cs typeface="Courier New"/>
+                        </a:rPr>
+                        <a:t>0</a:t>
+                      </a:r>
+                      <a:r>
+                        <a:rPr lang="en-US" sz="800" dirty="0">
+                          <a:latin typeface="Courier New"/>
+                          <a:cs typeface="Courier New"/>
+                        </a:rPr>
+                        <a:t> Streptomyces sp. C cont1.274</a:t>
                       </a:r>
                     </a:p>
                     <a:p>
@@ -5669,12 +5683,16 @@
                         <a:defRPr/>
                       </a:pPr>
                       <a:r>
-                        <a:rPr lang="en-US" sz="800" dirty="0">
-                          <a:latin typeface="Courier New"/>
-                          <a:cs typeface="Courier New"/>
-                        </a:rPr>
-                        <a:t>AAGGTCCGTCAACGGTCCGGCCGAGGGTTCTTCCTG</a:t>
-                      </a:r>
+                        <a:rPr lang="en-US" sz="800">
+                          <a:latin typeface="Courier New"/>
+                          <a:cs typeface="Courier New"/>
+                        </a:rPr>
+                        <a:t>AAGGTCCGTCAACGGTCCGGCCGAGGGTTCTTCCTGTAG</a:t>
+                      </a:r>
+                      <a:endParaRPr lang="en-US" sz="800" dirty="0">
+                        <a:latin typeface="Courier New"/>
+                        <a:cs typeface="Courier New"/>
+                      </a:endParaRPr>
                     </a:p>
                   </a:txBody>
                   <a:tcPr marL="45720" marR="45720"/>

</xml_diff>